<commit_message>
Project 1 PPT v2
</commit_message>
<xml_diff>
--- a/Robert.Johnson_project.1_game_Sales.pptx
+++ b/Robert.Johnson_project.1_game_Sales.pptx
@@ -19,6 +19,7 @@
     <p:sldId id="264" r:id="rId13"/>
     <p:sldId id="271" r:id="rId14"/>
     <p:sldId id="265" r:id="rId15"/>
+    <p:sldId id="276" r:id="rId16"/>
   </p:sldIdLst>
   <p:sldSz cx="12192000" cy="6858000"/>
   <p:notesSz cx="6858000" cy="9144000"/>
@@ -5588,7 +5589,7 @@
           <a:p>
             <a:fld id="{48A87A34-81AB-432B-8DAE-1953F412C126}" type="datetimeFigureOut">
               <a:rPr lang="en-US" smtClean="0"/>
-              <a:t>3/7/2020</a:t>
+              <a:t>6/5/2020</a:t>
             </a:fld>
             <a:endParaRPr lang="en-US" dirty="0"/>
           </a:p>
@@ -6008,7 +6009,7 @@
             <a:fld id="{48A87A34-81AB-432B-8DAE-1953F412C126}" type="datetimeFigureOut">
               <a:rPr lang="en-US" smtClean="0"/>
               <a:pPr/>
-              <a:t>3/7/2020</a:t>
+              <a:t>6/5/2020</a:t>
             </a:fld>
             <a:endParaRPr lang="en-US" dirty="0"/>
           </a:p>
@@ -6346,7 +6347,7 @@
             <a:fld id="{48A87A34-81AB-432B-8DAE-1953F412C126}" type="datetimeFigureOut">
               <a:rPr lang="en-US" smtClean="0"/>
               <a:pPr/>
-              <a:t>3/7/2020</a:t>
+              <a:t>6/5/2020</a:t>
             </a:fld>
             <a:endParaRPr lang="en-US" dirty="0"/>
           </a:p>
@@ -6753,7 +6754,7 @@
             <a:fld id="{48A87A34-81AB-432B-8DAE-1953F412C126}" type="datetimeFigureOut">
               <a:rPr lang="en-US" smtClean="0"/>
               <a:pPr/>
-              <a:t>3/7/2020</a:t>
+              <a:t>6/5/2020</a:t>
             </a:fld>
             <a:endParaRPr lang="en-US" dirty="0"/>
           </a:p>
@@ -7323,7 +7324,7 @@
             <a:fld id="{48A87A34-81AB-432B-8DAE-1953F412C126}" type="datetimeFigureOut">
               <a:rPr lang="en-US" smtClean="0"/>
               <a:pPr/>
-              <a:t>3/7/2020</a:t>
+              <a:t>6/5/2020</a:t>
             </a:fld>
             <a:endParaRPr lang="en-US" dirty="0"/>
           </a:p>
@@ -8006,7 +8007,7 @@
             <a:fld id="{48A87A34-81AB-432B-8DAE-1953F412C126}" type="datetimeFigureOut">
               <a:rPr lang="en-US" smtClean="0"/>
               <a:pPr/>
-              <a:t>3/7/2020</a:t>
+              <a:t>6/5/2020</a:t>
             </a:fld>
             <a:endParaRPr lang="en-US" dirty="0"/>
           </a:p>
@@ -8921,7 +8922,7 @@
             <a:fld id="{48A87A34-81AB-432B-8DAE-1953F412C126}" type="datetimeFigureOut">
               <a:rPr lang="en-US" smtClean="0"/>
               <a:pPr/>
-              <a:t>3/7/2020</a:t>
+              <a:t>6/5/2020</a:t>
             </a:fld>
             <a:endParaRPr lang="en-US" dirty="0"/>
           </a:p>
@@ -9236,7 +9237,7 @@
             <a:fld id="{48A87A34-81AB-432B-8DAE-1953F412C126}" type="datetimeFigureOut">
               <a:rPr lang="en-US" smtClean="0"/>
               <a:pPr/>
-              <a:t>3/7/2020</a:t>
+              <a:t>6/5/2020</a:t>
             </a:fld>
             <a:endParaRPr lang="en-US" dirty="0"/>
           </a:p>
@@ -9502,7 +9503,7 @@
             <a:fld id="{48A87A34-81AB-432B-8DAE-1953F412C126}" type="datetimeFigureOut">
               <a:rPr lang="en-US" smtClean="0"/>
               <a:pPr/>
-              <a:t>3/7/2020</a:t>
+              <a:t>6/5/2020</a:t>
             </a:fld>
             <a:endParaRPr lang="en-US" dirty="0"/>
           </a:p>
@@ -9827,7 +9828,7 @@
             <a:fld id="{48A87A34-81AB-432B-8DAE-1953F412C126}" type="datetimeFigureOut">
               <a:rPr lang="en-US" smtClean="0"/>
               <a:pPr/>
-              <a:t>3/7/2020</a:t>
+              <a:t>6/5/2020</a:t>
             </a:fld>
             <a:endParaRPr lang="en-US" dirty="0"/>
           </a:p>
@@ -10218,7 +10219,7 @@
             <a:fld id="{48A87A34-81AB-432B-8DAE-1953F412C126}" type="datetimeFigureOut">
               <a:rPr lang="en-US" smtClean="0"/>
               <a:pPr/>
-              <a:t>3/7/2020</a:t>
+              <a:t>6/5/2020</a:t>
             </a:fld>
             <a:endParaRPr lang="en-US" dirty="0"/>
           </a:p>
@@ -10595,7 +10596,7 @@
             <a:fld id="{48A87A34-81AB-432B-8DAE-1953F412C126}" type="datetimeFigureOut">
               <a:rPr lang="en-US" smtClean="0"/>
               <a:pPr/>
-              <a:t>3/7/2020</a:t>
+              <a:t>6/5/2020</a:t>
             </a:fld>
             <a:endParaRPr lang="en-US" dirty="0"/>
           </a:p>
@@ -11103,7 +11104,7 @@
             <a:fld id="{48A87A34-81AB-432B-8DAE-1953F412C126}" type="datetimeFigureOut">
               <a:rPr lang="en-US" smtClean="0"/>
               <a:pPr/>
-              <a:t>3/7/2020</a:t>
+              <a:t>6/5/2020</a:t>
             </a:fld>
             <a:endParaRPr lang="en-US" dirty="0"/>
           </a:p>
@@ -11361,7 +11362,7 @@
           <a:p>
             <a:fld id="{48A87A34-81AB-432B-8DAE-1953F412C126}" type="datetimeFigureOut">
               <a:rPr lang="en-US" smtClean="0"/>
-              <a:t>3/7/2020</a:t>
+              <a:t>6/5/2020</a:t>
             </a:fld>
             <a:endParaRPr lang="en-US" dirty="0"/>
           </a:p>
@@ -11524,7 +11525,7 @@
           <a:p>
             <a:fld id="{48A87A34-81AB-432B-8DAE-1953F412C126}" type="datetimeFigureOut">
               <a:rPr lang="en-US" smtClean="0"/>
-              <a:t>3/7/2020</a:t>
+              <a:t>6/5/2020</a:t>
             </a:fld>
             <a:endParaRPr lang="en-US" dirty="0"/>
           </a:p>
@@ -11920,7 +11921,7 @@
             <a:fld id="{48A87A34-81AB-432B-8DAE-1953F412C126}" type="datetimeFigureOut">
               <a:rPr lang="en-US" smtClean="0"/>
               <a:pPr/>
-              <a:t>3/7/2020</a:t>
+              <a:t>6/5/2020</a:t>
             </a:fld>
             <a:endParaRPr lang="en-US" dirty="0"/>
           </a:p>
@@ -12335,7 +12336,7 @@
           <a:p>
             <a:fld id="{48A87A34-81AB-432B-8DAE-1953F412C126}" type="datetimeFigureOut">
               <a:rPr lang="en-US" smtClean="0"/>
-              <a:t>3/7/2020</a:t>
+              <a:t>6/5/2020</a:t>
             </a:fld>
             <a:endParaRPr lang="en-US" dirty="0"/>
           </a:p>
@@ -12580,7 +12581,7 @@
             <a:fld id="{48A87A34-81AB-432B-8DAE-1953F412C126}" type="datetimeFigureOut">
               <a:rPr lang="en-US" smtClean="0"/>
               <a:pPr/>
-              <a:t>3/7/2020</a:t>
+              <a:t>6/5/2020</a:t>
             </a:fld>
             <a:endParaRPr lang="en-US" dirty="0"/>
           </a:p>
@@ -13592,12 +13593,51 @@
           </a:prstGeom>
         </p:spPr>
       </p:pic>
+      <p:sp>
+        <p:nvSpPr>
+          <p:cNvPr id="14" name="TextBox 13">
+            <a:extLst>
+              <a:ext uri="{FF2B5EF4-FFF2-40B4-BE49-F238E27FC236}">
+                <a16:creationId xmlns:a16="http://schemas.microsoft.com/office/drawing/2014/main" id="{A8A8C87B-DA10-4DF0-8980-595C1B2AEED9}"/>
+              </a:ext>
+            </a:extLst>
+          </p:cNvPr>
+          <p:cNvSpPr txBox="1"/>
+          <p:nvPr/>
+        </p:nvSpPr>
+        <p:spPr>
+          <a:xfrm>
+            <a:off x="2772698" y="1427644"/>
+            <a:ext cx="6147128" cy="523220"/>
+          </a:xfrm>
+          <a:prstGeom prst="rect">
+            <a:avLst/>
+          </a:prstGeom>
+          <a:noFill/>
+        </p:spPr>
+        <p:txBody>
+          <a:bodyPr wrap="square" rtlCol="0">
+            <a:spAutoFit/>
+          </a:bodyPr>
+          <a:lstStyle/>
+          <a:p>
+            <a:r>
+              <a:rPr lang="en-US" sz="2800" dirty="0">
+                <a:solidFill>
+                  <a:srgbClr val="FFC000"/>
+                </a:solidFill>
+              </a:rPr>
+              <a:t>BEST SELLING GENRE BY CONSOLES</a:t>
+            </a:r>
+          </a:p>
+        </p:txBody>
+      </p:sp>
       <p:pic>
         <p:nvPicPr>
-          <p:cNvPr id="12" name="Picture 11">
+          <p:cNvPr id="2" name="Picture 1">
             <a:extLst>
               <a:ext uri="{FF2B5EF4-FFF2-40B4-BE49-F238E27FC236}">
-                <a16:creationId xmlns:a16="http://schemas.microsoft.com/office/drawing/2014/main" id="{5A3D268B-C442-4EB9-B2F0-B8DB6C2CB92E}"/>
+                <a16:creationId xmlns:a16="http://schemas.microsoft.com/office/drawing/2014/main" id="{87329542-8064-4914-A521-372B1374DC52}"/>
               </a:ext>
             </a:extLst>
           </p:cNvPr>
@@ -13614,53 +13654,14 @@
         </p:blipFill>
         <p:spPr>
           <a:xfrm>
-            <a:off x="719967" y="2184604"/>
-            <a:ext cx="10172852" cy="4381377"/>
+            <a:off x="680833" y="2272770"/>
+            <a:ext cx="10142149" cy="4379489"/>
           </a:xfrm>
           <a:prstGeom prst="rect">
             <a:avLst/>
           </a:prstGeom>
         </p:spPr>
       </p:pic>
-      <p:sp>
-        <p:nvSpPr>
-          <p:cNvPr id="14" name="TextBox 13">
-            <a:extLst>
-              <a:ext uri="{FF2B5EF4-FFF2-40B4-BE49-F238E27FC236}">
-                <a16:creationId xmlns:a16="http://schemas.microsoft.com/office/drawing/2014/main" id="{A8A8C87B-DA10-4DF0-8980-595C1B2AEED9}"/>
-              </a:ext>
-            </a:extLst>
-          </p:cNvPr>
-          <p:cNvSpPr txBox="1"/>
-          <p:nvPr/>
-        </p:nvSpPr>
-        <p:spPr>
-          <a:xfrm>
-            <a:off x="2772698" y="1427644"/>
-            <a:ext cx="6147128" cy="523220"/>
-          </a:xfrm>
-          <a:prstGeom prst="rect">
-            <a:avLst/>
-          </a:prstGeom>
-          <a:noFill/>
-        </p:spPr>
-        <p:txBody>
-          <a:bodyPr wrap="square" rtlCol="0">
-            <a:spAutoFit/>
-          </a:bodyPr>
-          <a:lstStyle/>
-          <a:p>
-            <a:r>
-              <a:rPr lang="en-US" sz="2800" dirty="0">
-                <a:solidFill>
-                  <a:srgbClr val="FFC000"/>
-                </a:solidFill>
-              </a:rPr>
-              <a:t>BEST SELLING GENRE BY CONSOLES</a:t>
-            </a:r>
-          </a:p>
-        </p:txBody>
-      </p:sp>
     </p:spTree>
     <p:extLst>
       <p:ext uri="{BB962C8B-B14F-4D97-AF65-F5344CB8AC3E}">
@@ -14717,19 +14718,160 @@
         </p:nvSpPr>
         <p:spPr>
           <a:xfrm>
+            <a:off x="1708999" y="2011447"/>
+            <a:ext cx="9078866" cy="4307160"/>
+          </a:xfrm>
+        </p:spPr>
+        <p:txBody>
+          <a:bodyPr>
+            <a:normAutofit fontScale="92500" lnSpcReduction="10000"/>
+          </a:bodyPr>
+          <a:lstStyle/>
+          <a:p>
+            <a:endParaRPr lang="en-US" dirty="0"/>
+          </a:p>
+          <a:p>
+            <a:r>
+              <a:rPr lang="en-US" dirty="0"/>
+              <a:t>While there have been more than 70 company to make gaming consoles three companies </a:t>
+            </a:r>
+            <a:r>
+              <a:rPr lang="en-US" dirty="0" err="1"/>
+              <a:t>domninate</a:t>
+            </a:r>
+            <a:r>
+              <a:rPr lang="en-US" dirty="0"/>
+              <a:t> the game sales market, Nintendo, PlayStation, Xbox.</a:t>
+            </a:r>
+          </a:p>
+          <a:p>
+            <a:pPr marL="0" indent="0">
+              <a:buNone/>
+            </a:pPr>
+            <a:endParaRPr lang="en-US" dirty="0"/>
+          </a:p>
+          <a:p>
+            <a:r>
+              <a:rPr lang="en-US" dirty="0"/>
+              <a:t>Nintendo has the overall sales lead because they focus on children and casual gamer, thus they have no direct competitor. From a market position, they are in the best place to differentiate themselves and experience exponential growth. </a:t>
+            </a:r>
+          </a:p>
+          <a:p>
+            <a:pPr marL="0" indent="0">
+              <a:buNone/>
+            </a:pPr>
+            <a:endParaRPr lang="en-US" sz="2400" dirty="0"/>
+          </a:p>
+          <a:p>
+            <a:r>
+              <a:rPr lang="en-US" dirty="0"/>
+              <a:t>PlayStation and Xbox are chasing the same customers. PlayStation has been wining since 2011.  </a:t>
+            </a:r>
+            <a:r>
+              <a:rPr lang="en-US" sz="2400" dirty="0"/>
+              <a:t>  </a:t>
+            </a:r>
+          </a:p>
+        </p:txBody>
+      </p:sp>
+    </p:spTree>
+    <p:extLst>
+      <p:ext uri="{BB962C8B-B14F-4D97-AF65-F5344CB8AC3E}">
+        <p14:creationId xmlns:p14="http://schemas.microsoft.com/office/powerpoint/2010/main" val="2910743129"/>
+      </p:ext>
+    </p:extLst>
+  </p:cSld>
+  <p:clrMapOvr>
+    <a:masterClrMapping/>
+  </p:clrMapOvr>
+</p:sld>
+</file>
+
+<file path=ppt/slides/slide15.xml><?xml version="1.0" encoding="utf-8"?>
+<p:sld xmlns:a="http://schemas.openxmlformats.org/drawingml/2006/main" xmlns:r="http://schemas.openxmlformats.org/officeDocument/2006/relationships" xmlns:p="http://schemas.openxmlformats.org/presentationml/2006/main">
+  <p:cSld>
+    <p:spTree>
+      <p:nvGrpSpPr>
+        <p:cNvPr id="1" name=""/>
+        <p:cNvGrpSpPr/>
+        <p:nvPr/>
+      </p:nvGrpSpPr>
+      <p:grpSpPr>
+        <a:xfrm>
+          <a:off x="0" y="0"/>
+          <a:ext cx="0" cy="0"/>
+          <a:chOff x="0" y="0"/>
+          <a:chExt cx="0" cy="0"/>
+        </a:xfrm>
+      </p:grpSpPr>
+      <p:sp>
+        <p:nvSpPr>
+          <p:cNvPr id="2" name="Title 1">
+            <a:extLst>
+              <a:ext uri="{FF2B5EF4-FFF2-40B4-BE49-F238E27FC236}">
+                <a16:creationId xmlns:a16="http://schemas.microsoft.com/office/drawing/2014/main" id="{56FADF4F-81BC-4EC8-AC5D-9CB4EFD65DB8}"/>
+              </a:ext>
+            </a:extLst>
+          </p:cNvPr>
+          <p:cNvSpPr>
+            <a:spLocks noGrp="1"/>
+          </p:cNvSpPr>
+          <p:nvPr>
+            <p:ph type="title"/>
+          </p:nvPr>
+        </p:nvSpPr>
+        <p:spPr>
+          <a:xfrm>
+            <a:off x="1457761" y="319343"/>
+            <a:ext cx="8610600" cy="1293028"/>
+          </a:xfrm>
+        </p:spPr>
+        <p:txBody>
+          <a:bodyPr/>
+          <a:lstStyle/>
+          <a:p>
+            <a:pPr algn="ctr"/>
+            <a:br>
+              <a:rPr lang="en-US" dirty="0"/>
+            </a:br>
+            <a:r>
+              <a:rPr lang="en-US" dirty="0"/>
+              <a:t>DATA SET SUMMARY </a:t>
+            </a:r>
+          </a:p>
+        </p:txBody>
+      </p:sp>
+      <p:sp>
+        <p:nvSpPr>
+          <p:cNvPr id="3" name="Content Placeholder 2">
+            <a:extLst>
+              <a:ext uri="{FF2B5EF4-FFF2-40B4-BE49-F238E27FC236}">
+                <a16:creationId xmlns:a16="http://schemas.microsoft.com/office/drawing/2014/main" id="{C891F9DA-99FE-450A-9C82-5560A9ED5BB1}"/>
+              </a:ext>
+            </a:extLst>
+          </p:cNvPr>
+          <p:cNvSpPr>
+            <a:spLocks noGrp="1"/>
+          </p:cNvSpPr>
+          <p:nvPr>
+            <p:ph sz="half" idx="1"/>
+          </p:nvPr>
+        </p:nvSpPr>
+        <p:spPr>
+          <a:xfrm>
             <a:off x="1698724" y="2206656"/>
             <a:ext cx="8662533" cy="4024125"/>
           </a:xfrm>
         </p:spPr>
         <p:txBody>
           <a:bodyPr>
-            <a:normAutofit/>
+            <a:normAutofit lnSpcReduction="10000"/>
           </a:bodyPr>
           <a:lstStyle/>
           <a:p>
             <a:r>
               <a:rPr lang="en-US" dirty="0"/>
-              <a:t>Over the 40 years of data in this set the historical trend of the console industry are clear.  Nintendo has the clear game sales lead because long history and 10 consoles. </a:t>
+              <a:t>The 30 years of data in this set shows the historical trend of the console industry is toward growth. </a:t>
             </a:r>
             <a:r>
               <a:rPr lang="en-US" sz="2400" dirty="0"/>
@@ -14742,23 +14884,45 @@
           <a:p>
             <a:r>
               <a:rPr lang="en-US" dirty="0"/>
-              <a:t>An action game is the best-selling console game</a:t>
+              <a:t>Action games are the best-selling genre for console games</a:t>
             </a:r>
             <a:r>
               <a:rPr lang="en-US" sz="2400" dirty="0"/>
-              <a:t>. However nine of the 12 best selling game are exclusive to Nintendo.</a:t>
+              <a:t>.</a:t>
             </a:r>
           </a:p>
           <a:p>
-            <a:pPr marL="0" indent="0">
-              <a:buNone/>
-            </a:pPr>
+            <a:endParaRPr lang="en-US" sz="2400" dirty="0"/>
+          </a:p>
+          <a:p>
+            <a:r>
+              <a:rPr lang="en-US" sz="2400" dirty="0"/>
+              <a:t> Nine of the 12 best selling games by genre are exclusive to Nintendo.</a:t>
+            </a:r>
+          </a:p>
+          <a:p>
             <a:endParaRPr lang="en-US" sz="2400" dirty="0"/>
           </a:p>
           <a:p>
             <a:r>
               <a:rPr lang="en-US" dirty="0"/>
-              <a:t>The next 40 years of console gaming will be interesting to see if Nintendo will be overtaken by PlayStation or Xbox.  </a:t>
+              <a:t>This data set lends itself better for historical </a:t>
+            </a:r>
+            <a:r>
+              <a:rPr lang="en-US" dirty="0" err="1"/>
+              <a:t>anaylas</a:t>
+            </a:r>
+            <a:r>
+              <a:rPr lang="en-US" dirty="0"/>
+              <a:t> instead of predictive model </a:t>
+            </a:r>
+            <a:r>
+              <a:rPr lang="en-US" dirty="0" err="1"/>
+              <a:t>bulding</a:t>
+            </a:r>
+            <a:r>
+              <a:rPr lang="en-US" dirty="0"/>
+              <a:t>.  </a:t>
             </a:r>
             <a:r>
               <a:rPr lang="en-US" sz="2400" dirty="0"/>
@@ -14770,7 +14934,7 @@
     </p:spTree>
     <p:extLst>
       <p:ext uri="{BB962C8B-B14F-4D97-AF65-F5344CB8AC3E}">
-        <p14:creationId xmlns:p14="http://schemas.microsoft.com/office/powerpoint/2010/main" val="2910743129"/>
+        <p14:creationId xmlns:p14="http://schemas.microsoft.com/office/powerpoint/2010/main" val="1930444617"/>
       </p:ext>
     </p:extLst>
   </p:cSld>
@@ -16776,10 +16940,10 @@
       </p:sp>
       <p:pic>
         <p:nvPicPr>
-          <p:cNvPr id="5" name="Picture 4">
+          <p:cNvPr id="6" name="Picture 5">
             <a:extLst>
               <a:ext uri="{FF2B5EF4-FFF2-40B4-BE49-F238E27FC236}">
-                <a16:creationId xmlns:a16="http://schemas.microsoft.com/office/drawing/2014/main" id="{8E59A67B-BA5A-4453-8700-9A0B4A7F7566}"/>
+                <a16:creationId xmlns:a16="http://schemas.microsoft.com/office/drawing/2014/main" id="{9B935E9D-6C11-49E0-8D6C-78A1B193173C}"/>
               </a:ext>
             </a:extLst>
           </p:cNvPr>
@@ -16796,8 +16960,8 @@
         </p:blipFill>
         <p:spPr>
           <a:xfrm>
-            <a:off x="5178425" y="2228671"/>
-            <a:ext cx="6933666" cy="4511632"/>
+            <a:off x="6096000" y="2141339"/>
+            <a:ext cx="5758913" cy="4477573"/>
           </a:xfrm>
           <a:prstGeom prst="rect">
             <a:avLst/>

</xml_diff>

<commit_message>
Project 1 PPT v3
</commit_message>
<xml_diff>
--- a/Robert.Johnson_project.1_game_Sales.pptx
+++ b/Robert.Johnson_project.1_game_Sales.pptx
@@ -5589,7 +5589,7 @@
           <a:p>
             <a:fld id="{48A87A34-81AB-432B-8DAE-1953F412C126}" type="datetimeFigureOut">
               <a:rPr lang="en-US" smtClean="0"/>
-              <a:t>6/5/2020</a:t>
+              <a:t>6/6/2020</a:t>
             </a:fld>
             <a:endParaRPr lang="en-US" dirty="0"/>
           </a:p>
@@ -6009,7 +6009,7 @@
             <a:fld id="{48A87A34-81AB-432B-8DAE-1953F412C126}" type="datetimeFigureOut">
               <a:rPr lang="en-US" smtClean="0"/>
               <a:pPr/>
-              <a:t>6/5/2020</a:t>
+              <a:t>6/6/2020</a:t>
             </a:fld>
             <a:endParaRPr lang="en-US" dirty="0"/>
           </a:p>
@@ -6347,7 +6347,7 @@
             <a:fld id="{48A87A34-81AB-432B-8DAE-1953F412C126}" type="datetimeFigureOut">
               <a:rPr lang="en-US" smtClean="0"/>
               <a:pPr/>
-              <a:t>6/5/2020</a:t>
+              <a:t>6/6/2020</a:t>
             </a:fld>
             <a:endParaRPr lang="en-US" dirty="0"/>
           </a:p>
@@ -6754,7 +6754,7 @@
             <a:fld id="{48A87A34-81AB-432B-8DAE-1953F412C126}" type="datetimeFigureOut">
               <a:rPr lang="en-US" smtClean="0"/>
               <a:pPr/>
-              <a:t>6/5/2020</a:t>
+              <a:t>6/6/2020</a:t>
             </a:fld>
             <a:endParaRPr lang="en-US" dirty="0"/>
           </a:p>
@@ -7324,7 +7324,7 @@
             <a:fld id="{48A87A34-81AB-432B-8DAE-1953F412C126}" type="datetimeFigureOut">
               <a:rPr lang="en-US" smtClean="0"/>
               <a:pPr/>
-              <a:t>6/5/2020</a:t>
+              <a:t>6/6/2020</a:t>
             </a:fld>
             <a:endParaRPr lang="en-US" dirty="0"/>
           </a:p>
@@ -8007,7 +8007,7 @@
             <a:fld id="{48A87A34-81AB-432B-8DAE-1953F412C126}" type="datetimeFigureOut">
               <a:rPr lang="en-US" smtClean="0"/>
               <a:pPr/>
-              <a:t>6/5/2020</a:t>
+              <a:t>6/6/2020</a:t>
             </a:fld>
             <a:endParaRPr lang="en-US" dirty="0"/>
           </a:p>
@@ -8922,7 +8922,7 @@
             <a:fld id="{48A87A34-81AB-432B-8DAE-1953F412C126}" type="datetimeFigureOut">
               <a:rPr lang="en-US" smtClean="0"/>
               <a:pPr/>
-              <a:t>6/5/2020</a:t>
+              <a:t>6/6/2020</a:t>
             </a:fld>
             <a:endParaRPr lang="en-US" dirty="0"/>
           </a:p>
@@ -9237,7 +9237,7 @@
             <a:fld id="{48A87A34-81AB-432B-8DAE-1953F412C126}" type="datetimeFigureOut">
               <a:rPr lang="en-US" smtClean="0"/>
               <a:pPr/>
-              <a:t>6/5/2020</a:t>
+              <a:t>6/6/2020</a:t>
             </a:fld>
             <a:endParaRPr lang="en-US" dirty="0"/>
           </a:p>
@@ -9503,7 +9503,7 @@
             <a:fld id="{48A87A34-81AB-432B-8DAE-1953F412C126}" type="datetimeFigureOut">
               <a:rPr lang="en-US" smtClean="0"/>
               <a:pPr/>
-              <a:t>6/5/2020</a:t>
+              <a:t>6/6/2020</a:t>
             </a:fld>
             <a:endParaRPr lang="en-US" dirty="0"/>
           </a:p>
@@ -9828,7 +9828,7 @@
             <a:fld id="{48A87A34-81AB-432B-8DAE-1953F412C126}" type="datetimeFigureOut">
               <a:rPr lang="en-US" smtClean="0"/>
               <a:pPr/>
-              <a:t>6/5/2020</a:t>
+              <a:t>6/6/2020</a:t>
             </a:fld>
             <a:endParaRPr lang="en-US" dirty="0"/>
           </a:p>
@@ -10219,7 +10219,7 @@
             <a:fld id="{48A87A34-81AB-432B-8DAE-1953F412C126}" type="datetimeFigureOut">
               <a:rPr lang="en-US" smtClean="0"/>
               <a:pPr/>
-              <a:t>6/5/2020</a:t>
+              <a:t>6/6/2020</a:t>
             </a:fld>
             <a:endParaRPr lang="en-US" dirty="0"/>
           </a:p>
@@ -10596,7 +10596,7 @@
             <a:fld id="{48A87A34-81AB-432B-8DAE-1953F412C126}" type="datetimeFigureOut">
               <a:rPr lang="en-US" smtClean="0"/>
               <a:pPr/>
-              <a:t>6/5/2020</a:t>
+              <a:t>6/6/2020</a:t>
             </a:fld>
             <a:endParaRPr lang="en-US" dirty="0"/>
           </a:p>
@@ -11104,7 +11104,7 @@
             <a:fld id="{48A87A34-81AB-432B-8DAE-1953F412C126}" type="datetimeFigureOut">
               <a:rPr lang="en-US" smtClean="0"/>
               <a:pPr/>
-              <a:t>6/5/2020</a:t>
+              <a:t>6/6/2020</a:t>
             </a:fld>
             <a:endParaRPr lang="en-US" dirty="0"/>
           </a:p>
@@ -11362,7 +11362,7 @@
           <a:p>
             <a:fld id="{48A87A34-81AB-432B-8DAE-1953F412C126}" type="datetimeFigureOut">
               <a:rPr lang="en-US" smtClean="0"/>
-              <a:t>6/5/2020</a:t>
+              <a:t>6/6/2020</a:t>
             </a:fld>
             <a:endParaRPr lang="en-US" dirty="0"/>
           </a:p>
@@ -11525,7 +11525,7 @@
           <a:p>
             <a:fld id="{48A87A34-81AB-432B-8DAE-1953F412C126}" type="datetimeFigureOut">
               <a:rPr lang="en-US" smtClean="0"/>
-              <a:t>6/5/2020</a:t>
+              <a:t>6/6/2020</a:t>
             </a:fld>
             <a:endParaRPr lang="en-US" dirty="0"/>
           </a:p>
@@ -11921,7 +11921,7 @@
             <a:fld id="{48A87A34-81AB-432B-8DAE-1953F412C126}" type="datetimeFigureOut">
               <a:rPr lang="en-US" smtClean="0"/>
               <a:pPr/>
-              <a:t>6/5/2020</a:t>
+              <a:t>6/6/2020</a:t>
             </a:fld>
             <a:endParaRPr lang="en-US" dirty="0"/>
           </a:p>
@@ -12336,7 +12336,7 @@
           <a:p>
             <a:fld id="{48A87A34-81AB-432B-8DAE-1953F412C126}" type="datetimeFigureOut">
               <a:rPr lang="en-US" smtClean="0"/>
-              <a:t>6/5/2020</a:t>
+              <a:t>6/6/2020</a:t>
             </a:fld>
             <a:endParaRPr lang="en-US" dirty="0"/>
           </a:p>
@@ -12581,7 +12581,7 @@
             <a:fld id="{48A87A34-81AB-432B-8DAE-1953F412C126}" type="datetimeFigureOut">
               <a:rPr lang="en-US" smtClean="0"/>
               <a:pPr/>
-              <a:t>6/5/2020</a:t>
+              <a:t>6/6/2020</a:t>
             </a:fld>
             <a:endParaRPr lang="en-US" dirty="0"/>
           </a:p>
@@ -14906,23 +14906,7 @@
           <a:p>
             <a:r>
               <a:rPr lang="en-US" dirty="0"/>
-              <a:t>This data set lends itself better for historical </a:t>
-            </a:r>
-            <a:r>
-              <a:rPr lang="en-US" dirty="0" err="1"/>
-              <a:t>anaylas</a:t>
-            </a:r>
-            <a:r>
-              <a:rPr lang="en-US" dirty="0"/>
-              <a:t> instead of predictive model </a:t>
-            </a:r>
-            <a:r>
-              <a:rPr lang="en-US" dirty="0" err="1"/>
-              <a:t>bulding</a:t>
-            </a:r>
-            <a:r>
-              <a:rPr lang="en-US" dirty="0"/>
-              <a:t>.  </a:t>
+              <a:t>This data set lends itself better for historical analyses instead of predictive model building.  </a:t>
             </a:r>
             <a:r>
               <a:rPr lang="en-US" sz="2400" dirty="0"/>

</xml_diff>